<commit_message>
update course content week02 Tues
</commit_message>
<xml_diff>
--- a/google-drive/week02/2Tues/1_lasbest-hypothesis-testing.pptx
+++ b/google-drive/week02/2Tues/1_lasbest-hypothesis-testing.pptx
@@ -233,7 +233,7 @@
           <a:p>
             <a:fld id="{F3C7AE39-24BF-9046-BF66-BB2858E2304D}" type="datetimeFigureOut">
               <a:rPr lang="en-US" smtClean="0"/>
-              <a:t>6/20/22</a:t>
+              <a:t>6/16/23</a:t>
             </a:fld>
             <a:endParaRPr lang="en-US"/>
           </a:p>
@@ -410,7 +410,7 @@
           <a:p>
             <a:fld id="{ECC99FF1-95D4-D041-9B30-B541100C8263}" type="datetimeFigureOut">
               <a:rPr lang="en-US" smtClean="0"/>
-              <a:t>6/20/22</a:t>
+              <a:t>6/16/23</a:t>
             </a:fld>
             <a:endParaRPr lang="en-US"/>
           </a:p>
@@ -1577,66 +1577,6 @@
           </a:prstGeom>
         </p:spPr>
       </p:pic>
-      <p:pic>
-        <p:nvPicPr>
-          <p:cNvPr id="8" name="Picture 2">
-            <a:extLst>
-              <a:ext uri="{FF2B5EF4-FFF2-40B4-BE49-F238E27FC236}">
-                <a16:creationId xmlns:a16="http://schemas.microsoft.com/office/drawing/2014/main" id="{67D9E3D2-99B2-9D4F-879E-D1D4B4D76D08}"/>
-              </a:ext>
-            </a:extLst>
-          </p:cNvPr>
-          <p:cNvPicPr>
-            <a:picLocks noChangeAspect="1" noChangeArrowheads="1"/>
-          </p:cNvPicPr>
-          <p:nvPr userDrawn="1"/>
-        </p:nvPicPr>
-        <p:blipFill>
-          <a:blip r:embed="rId3">
-            <a:extLst>
-              <a:ext uri="{28A0092B-C50C-407E-A947-70E740481C1C}">
-                <a14:useLocalDpi xmlns:a14="http://schemas.microsoft.com/office/drawing/2010/main" val="0"/>
-              </a:ext>
-            </a:extLst>
-          </a:blip>
-          <a:srcRect/>
-          <a:stretch>
-            <a:fillRect/>
-          </a:stretch>
-        </p:blipFill>
-        <p:spPr bwMode="auto">
-          <a:xfrm>
-            <a:off x="85726" y="6060103"/>
-            <a:ext cx="764091" cy="731957"/>
-          </a:xfrm>
-          <a:prstGeom prst="rect">
-            <a:avLst/>
-          </a:prstGeom>
-          <a:noFill/>
-          <a:ln>
-            <a:noFill/>
-          </a:ln>
-          <a:extLst>
-            <a:ext uri="{909E8E84-426E-40DD-AFC4-6F175D3DCCD1}">
-              <a14:hiddenFill xmlns:a14="http://schemas.microsoft.com/office/drawing/2010/main">
-                <a:solidFill>
-                  <a:schemeClr val="accent1"/>
-                </a:solidFill>
-              </a14:hiddenFill>
-            </a:ext>
-            <a:ext uri="{91240B29-F687-4F45-9708-019B960494DF}">
-              <a14:hiddenLine xmlns:a14="http://schemas.microsoft.com/office/drawing/2010/main" w="9525">
-                <a:solidFill>
-                  <a:schemeClr val="tx1"/>
-                </a:solidFill>
-                <a:miter lim="800000"/>
-                <a:headEnd/>
-                <a:tailEnd/>
-              </a14:hiddenLine>
-            </a:ext>
-          </a:extLst>
-        </p:spPr>
-      </p:pic>
     </p:spTree>
     <p:extLst>
       <p:ext uri="{BB962C8B-B14F-4D97-AF65-F5344CB8AC3E}">
@@ -1806,66 +1746,6 @@
           </a:p>
         </p:txBody>
       </p:sp>
-      <p:pic>
-        <p:nvPicPr>
-          <p:cNvPr id="7" name="Picture 2">
-            <a:extLst>
-              <a:ext uri="{FF2B5EF4-FFF2-40B4-BE49-F238E27FC236}">
-                <a16:creationId xmlns:a16="http://schemas.microsoft.com/office/drawing/2014/main" id="{A29E8EC7-21FC-E74A-A95A-36823B5C2496}"/>
-              </a:ext>
-            </a:extLst>
-          </p:cNvPr>
-          <p:cNvPicPr>
-            <a:picLocks noChangeAspect="1" noChangeArrowheads="1"/>
-          </p:cNvPicPr>
-          <p:nvPr userDrawn="1"/>
-        </p:nvPicPr>
-        <p:blipFill>
-          <a:blip r:embed="rId2">
-            <a:extLst>
-              <a:ext uri="{28A0092B-C50C-407E-A947-70E740481C1C}">
-                <a14:useLocalDpi xmlns:a14="http://schemas.microsoft.com/office/drawing/2010/main" val="0"/>
-              </a:ext>
-            </a:extLst>
-          </a:blip>
-          <a:srcRect/>
-          <a:stretch>
-            <a:fillRect/>
-          </a:stretch>
-        </p:blipFill>
-        <p:spPr bwMode="auto">
-          <a:xfrm>
-            <a:off x="85726" y="6060103"/>
-            <a:ext cx="764091" cy="731957"/>
-          </a:xfrm>
-          <a:prstGeom prst="rect">
-            <a:avLst/>
-          </a:prstGeom>
-          <a:noFill/>
-          <a:ln>
-            <a:noFill/>
-          </a:ln>
-          <a:extLst>
-            <a:ext uri="{909E8E84-426E-40DD-AFC4-6F175D3DCCD1}">
-              <a14:hiddenFill xmlns:a14="http://schemas.microsoft.com/office/drawing/2010/main">
-                <a:solidFill>
-                  <a:schemeClr val="accent1"/>
-                </a:solidFill>
-              </a14:hiddenFill>
-            </a:ext>
-            <a:ext uri="{91240B29-F687-4F45-9708-019B960494DF}">
-              <a14:hiddenLine xmlns:a14="http://schemas.microsoft.com/office/drawing/2010/main" w="9525">
-                <a:solidFill>
-                  <a:schemeClr val="tx1"/>
-                </a:solidFill>
-                <a:miter lim="800000"/>
-                <a:headEnd/>
-                <a:tailEnd/>
-              </a14:hiddenLine>
-            </a:ext>
-          </a:extLst>
-        </p:spPr>
-      </p:pic>
     </p:spTree>
     <p:extLst>
       <p:ext uri="{BB962C8B-B14F-4D97-AF65-F5344CB8AC3E}">
@@ -2102,66 +1982,6 @@
           </a:p>
         </p:txBody>
       </p:sp>
-      <p:pic>
-        <p:nvPicPr>
-          <p:cNvPr id="8" name="Picture 2">
-            <a:extLst>
-              <a:ext uri="{FF2B5EF4-FFF2-40B4-BE49-F238E27FC236}">
-                <a16:creationId xmlns:a16="http://schemas.microsoft.com/office/drawing/2014/main" id="{184E9D19-E0B8-0947-BB64-E1C282226663}"/>
-              </a:ext>
-            </a:extLst>
-          </p:cNvPr>
-          <p:cNvPicPr>
-            <a:picLocks noChangeAspect="1" noChangeArrowheads="1"/>
-          </p:cNvPicPr>
-          <p:nvPr userDrawn="1"/>
-        </p:nvPicPr>
-        <p:blipFill>
-          <a:blip r:embed="rId2">
-            <a:extLst>
-              <a:ext uri="{28A0092B-C50C-407E-A947-70E740481C1C}">
-                <a14:useLocalDpi xmlns:a14="http://schemas.microsoft.com/office/drawing/2010/main" val="0"/>
-              </a:ext>
-            </a:extLst>
-          </a:blip>
-          <a:srcRect/>
-          <a:stretch>
-            <a:fillRect/>
-          </a:stretch>
-        </p:blipFill>
-        <p:spPr bwMode="auto">
-          <a:xfrm>
-            <a:off x="85726" y="6060103"/>
-            <a:ext cx="764091" cy="731957"/>
-          </a:xfrm>
-          <a:prstGeom prst="rect">
-            <a:avLst/>
-          </a:prstGeom>
-          <a:noFill/>
-          <a:ln>
-            <a:noFill/>
-          </a:ln>
-          <a:extLst>
-            <a:ext uri="{909E8E84-426E-40DD-AFC4-6F175D3DCCD1}">
-              <a14:hiddenFill xmlns:a14="http://schemas.microsoft.com/office/drawing/2010/main">
-                <a:solidFill>
-                  <a:schemeClr val="accent1"/>
-                </a:solidFill>
-              </a14:hiddenFill>
-            </a:ext>
-            <a:ext uri="{91240B29-F687-4F45-9708-019B960494DF}">
-              <a14:hiddenLine xmlns:a14="http://schemas.microsoft.com/office/drawing/2010/main" w="9525">
-                <a:solidFill>
-                  <a:schemeClr val="tx1"/>
-                </a:solidFill>
-                <a:miter lim="800000"/>
-                <a:headEnd/>
-                <a:tailEnd/>
-              </a14:hiddenLine>
-            </a:ext>
-          </a:extLst>
-        </p:spPr>
-      </p:pic>
     </p:spTree>
     <p:extLst>
       <p:ext uri="{BB962C8B-B14F-4D97-AF65-F5344CB8AC3E}">
@@ -2274,66 +2094,6 @@
           </a:p>
         </p:txBody>
       </p:sp>
-      <p:pic>
-        <p:nvPicPr>
-          <p:cNvPr id="6" name="Picture 2">
-            <a:extLst>
-              <a:ext uri="{FF2B5EF4-FFF2-40B4-BE49-F238E27FC236}">
-                <a16:creationId xmlns:a16="http://schemas.microsoft.com/office/drawing/2014/main" id="{4B2F1C79-AAE1-8546-A8CF-AF386EBA459C}"/>
-              </a:ext>
-            </a:extLst>
-          </p:cNvPr>
-          <p:cNvPicPr>
-            <a:picLocks noChangeAspect="1" noChangeArrowheads="1"/>
-          </p:cNvPicPr>
-          <p:nvPr userDrawn="1"/>
-        </p:nvPicPr>
-        <p:blipFill>
-          <a:blip r:embed="rId2">
-            <a:extLst>
-              <a:ext uri="{28A0092B-C50C-407E-A947-70E740481C1C}">
-                <a14:useLocalDpi xmlns:a14="http://schemas.microsoft.com/office/drawing/2010/main" val="0"/>
-              </a:ext>
-            </a:extLst>
-          </a:blip>
-          <a:srcRect/>
-          <a:stretch>
-            <a:fillRect/>
-          </a:stretch>
-        </p:blipFill>
-        <p:spPr bwMode="auto">
-          <a:xfrm>
-            <a:off x="85726" y="6060103"/>
-            <a:ext cx="764091" cy="731957"/>
-          </a:xfrm>
-          <a:prstGeom prst="rect">
-            <a:avLst/>
-          </a:prstGeom>
-          <a:noFill/>
-          <a:ln>
-            <a:noFill/>
-          </a:ln>
-          <a:extLst>
-            <a:ext uri="{909E8E84-426E-40DD-AFC4-6F175D3DCCD1}">
-              <a14:hiddenFill xmlns:a14="http://schemas.microsoft.com/office/drawing/2010/main">
-                <a:solidFill>
-                  <a:schemeClr val="accent1"/>
-                </a:solidFill>
-              </a14:hiddenFill>
-            </a:ext>
-            <a:ext uri="{91240B29-F687-4F45-9708-019B960494DF}">
-              <a14:hiddenLine xmlns:a14="http://schemas.microsoft.com/office/drawing/2010/main" w="9525">
-                <a:solidFill>
-                  <a:schemeClr val="tx1"/>
-                </a:solidFill>
-                <a:miter lim="800000"/>
-                <a:headEnd/>
-                <a:tailEnd/>
-              </a14:hiddenLine>
-            </a:ext>
-          </a:extLst>
-        </p:spPr>
-      </p:pic>
     </p:spTree>
     <p:extLst>
       <p:ext uri="{BB962C8B-B14F-4D97-AF65-F5344CB8AC3E}">
@@ -2418,66 +2178,6 @@
           </a:p>
         </p:txBody>
       </p:sp>
-      <p:pic>
-        <p:nvPicPr>
-          <p:cNvPr id="5" name="Picture 2">
-            <a:extLst>
-              <a:ext uri="{FF2B5EF4-FFF2-40B4-BE49-F238E27FC236}">
-                <a16:creationId xmlns:a16="http://schemas.microsoft.com/office/drawing/2014/main" id="{79D4C0F1-72B1-D84D-97A7-B095096D03A6}"/>
-              </a:ext>
-            </a:extLst>
-          </p:cNvPr>
-          <p:cNvPicPr>
-            <a:picLocks noChangeAspect="1" noChangeArrowheads="1"/>
-          </p:cNvPicPr>
-          <p:nvPr userDrawn="1"/>
-        </p:nvPicPr>
-        <p:blipFill>
-          <a:blip r:embed="rId2">
-            <a:extLst>
-              <a:ext uri="{28A0092B-C50C-407E-A947-70E740481C1C}">
-                <a14:useLocalDpi xmlns:a14="http://schemas.microsoft.com/office/drawing/2010/main" val="0"/>
-              </a:ext>
-            </a:extLst>
-          </a:blip>
-          <a:srcRect/>
-          <a:stretch>
-            <a:fillRect/>
-          </a:stretch>
-        </p:blipFill>
-        <p:spPr bwMode="auto">
-          <a:xfrm>
-            <a:off x="85726" y="6060103"/>
-            <a:ext cx="764091" cy="731957"/>
-          </a:xfrm>
-          <a:prstGeom prst="rect">
-            <a:avLst/>
-          </a:prstGeom>
-          <a:noFill/>
-          <a:ln>
-            <a:noFill/>
-          </a:ln>
-          <a:extLst>
-            <a:ext uri="{909E8E84-426E-40DD-AFC4-6F175D3DCCD1}">
-              <a14:hiddenFill xmlns:a14="http://schemas.microsoft.com/office/drawing/2010/main">
-                <a:solidFill>
-                  <a:schemeClr val="accent1"/>
-                </a:solidFill>
-              </a14:hiddenFill>
-            </a:ext>
-            <a:ext uri="{91240B29-F687-4F45-9708-019B960494DF}">
-              <a14:hiddenLine xmlns:a14="http://schemas.microsoft.com/office/drawing/2010/main" w="9525">
-                <a:solidFill>
-                  <a:schemeClr val="tx1"/>
-                </a:solidFill>
-                <a:miter lim="800000"/>
-                <a:headEnd/>
-                <a:tailEnd/>
-              </a14:hiddenLine>
-            </a:ext>
-          </a:extLst>
-        </p:spPr>
-      </p:pic>
     </p:spTree>
     <p:extLst>
       <p:ext uri="{BB962C8B-B14F-4D97-AF65-F5344CB8AC3E}">
@@ -2710,62 +2410,32 @@
       </p:sp>
       <p:pic>
         <p:nvPicPr>
-          <p:cNvPr id="7" name="Picture 2">
+          <p:cNvPr id="8" name="Picture 7" descr="A black and red text&#10;&#10;Description automatically generated with low confidence">
             <a:extLst>
               <a:ext uri="{FF2B5EF4-FFF2-40B4-BE49-F238E27FC236}">
-                <a16:creationId xmlns:a16="http://schemas.microsoft.com/office/drawing/2014/main" id="{34297335-7B6F-2845-BD41-C9FA63BC0CB0}"/>
+                <a16:creationId xmlns:a16="http://schemas.microsoft.com/office/drawing/2014/main" id="{8D7A7A9D-D9CE-8E23-D652-17AA7C7E995D}"/>
               </a:ext>
             </a:extLst>
           </p:cNvPr>
           <p:cNvPicPr>
-            <a:picLocks noChangeAspect="1" noChangeArrowheads="1"/>
+            <a:picLocks noChangeAspect="1"/>
           </p:cNvPicPr>
           <p:nvPr userDrawn="1"/>
         </p:nvPicPr>
         <p:blipFill>
-          <a:blip r:embed="rId7">
-            <a:extLst>
-              <a:ext uri="{28A0092B-C50C-407E-A947-70E740481C1C}">
-                <a14:useLocalDpi xmlns:a14="http://schemas.microsoft.com/office/drawing/2010/main" val="0"/>
-              </a:ext>
-            </a:extLst>
-          </a:blip>
-          <a:srcRect/>
+          <a:blip r:embed="rId7"/>
           <a:stretch>
             <a:fillRect/>
           </a:stretch>
         </p:blipFill>
-        <p:spPr bwMode="auto">
+        <p:spPr>
           <a:xfrm>
-            <a:off x="85726" y="6060103"/>
-            <a:ext cx="764091" cy="731957"/>
+            <a:off x="68377" y="6030308"/>
+            <a:ext cx="885827" cy="778203"/>
           </a:xfrm>
           <a:prstGeom prst="rect">
             <a:avLst/>
           </a:prstGeom>
-          <a:noFill/>
-          <a:ln>
-            <a:noFill/>
-          </a:ln>
-          <a:extLst>
-            <a:ext uri="{909E8E84-426E-40DD-AFC4-6F175D3DCCD1}">
-              <a14:hiddenFill xmlns:a14="http://schemas.microsoft.com/office/drawing/2010/main">
-                <a:solidFill>
-                  <a:schemeClr val="accent1"/>
-                </a:solidFill>
-              </a14:hiddenFill>
-            </a:ext>
-            <a:ext uri="{91240B29-F687-4F45-9708-019B960494DF}">
-              <a14:hiddenLine xmlns:a14="http://schemas.microsoft.com/office/drawing/2010/main" w="9525">
-                <a:solidFill>
-                  <a:schemeClr val="tx1"/>
-                </a:solidFill>
-                <a:miter lim="800000"/>
-                <a:headEnd/>
-                <a:tailEnd/>
-              </a14:hiddenLine>
-            </a:ext>
-          </a:extLst>
         </p:spPr>
       </p:pic>
     </p:spTree>
@@ -8065,6 +7735,51 @@
                       </p:childTnLst>
                     </p:cTn>
                   </p:par>
+                  <p:par>
+                    <p:cTn id="49" fill="hold">
+                      <p:stCondLst>
+                        <p:cond delay="indefinite"/>
+                      </p:stCondLst>
+                      <p:childTnLst>
+                        <p:par>
+                          <p:cTn id="50" fill="hold">
+                            <p:stCondLst>
+                              <p:cond delay="0"/>
+                            </p:stCondLst>
+                            <p:childTnLst>
+                              <p:par>
+                                <p:cTn id="51" presetID="1" presetClass="entr" presetSubtype="0" fill="hold" grpId="0" nodeType="clickEffect">
+                                  <p:stCondLst>
+                                    <p:cond delay="0"/>
+                                  </p:stCondLst>
+                                  <p:childTnLst>
+                                    <p:set>
+                                      <p:cBhvr>
+                                        <p:cTn id="52" dur="1" fill="hold">
+                                          <p:stCondLst>
+                                            <p:cond delay="0"/>
+                                          </p:stCondLst>
+                                        </p:cTn>
+                                        <p:tgtEl>
+                                          <p:spTgt spid="2"/>
+                                        </p:tgtEl>
+                                        <p:attrNameLst>
+                                          <p:attrName>style.visibility</p:attrName>
+                                        </p:attrNameLst>
+                                      </p:cBhvr>
+                                      <p:to>
+                                        <p:strVal val="visible"/>
+                                      </p:to>
+                                    </p:set>
+                                  </p:childTnLst>
+                                </p:cTn>
+                              </p:par>
+                            </p:childTnLst>
+                          </p:cTn>
+                        </p:par>
+                      </p:childTnLst>
+                    </p:cTn>
+                  </p:par>
                 </p:childTnLst>
               </p:cTn>
               <p:prevCondLst>
@@ -8101,6 +7816,7 @@
       <p:bldP spid="24" grpId="0"/>
       <p:bldP spid="25" grpId="0"/>
       <p:bldP spid="26" grpId="0"/>
+      <p:bldP spid="2" grpId="0"/>
     </p:bldLst>
   </p:timing>
 </p:sld>
@@ -9857,7 +9573,7 @@
             </a:pPr>
             <a:r>
               <a:rPr lang="en-US" dirty="0"/>
-              <a:t>	HOWEVER, we can describe the circumstances under which a 	causal association could be inferred (Dr. Garcia’s lecture, Week 1)</a:t>
+              <a:t>	HOWEVER, we can describe the circumstances under which a 	causal association could be inferred (Dr. Garcia’s lecture)</a:t>
             </a:r>
           </a:p>
         </p:txBody>

</xml_diff>